<commit_message>
Adding Densenet-ViT and CDC-Densenet code updated for calculating metrics
</commit_message>
<xml_diff>
--- a/PPTs/Face Anti-Spoofing presentation - BTP work status.pptx
+++ b/PPTs/Face Anti-Spoofing presentation - BTP work status.pptx
@@ -6109,14 +6109,14 @@
         </p:nvSpPr>
         <p:spPr>
           <a:xfrm>
-            <a:off x="4572000" y="25"/>
+            <a:off x="4572000" y="-125"/>
             <a:ext cx="4572000" cy="5143500"/>
           </a:xfrm>
           <a:prstGeom prst="rect">
             <a:avLst/>
           </a:prstGeom>
           <a:solidFill>
-            <a:schemeClr val="dk2"/>
+            <a:schemeClr val="lt2"/>
           </a:solidFill>
           <a:ln>
             <a:noFill/>
@@ -6431,7 +6431,7 @@
         </p:nvSpPr>
         <p:spPr>
           <a:xfrm>
-            <a:off x="4939500" y="724200"/>
+            <a:off x="4939500" y="724075"/>
             <a:ext cx="3837000" cy="3695100"/>
           </a:xfrm>
           <a:prstGeom prst="rect">
@@ -6450,16 +6450,9 @@
               <a:spcAft>
                 <a:spcPts val="0"/>
               </a:spcAft>
-              <a:buClr>
-                <a:schemeClr val="dk1"/>
-              </a:buClr>
               <a:buSzPts val="1800"/>
               <a:buChar char="●"/>
-              <a:defRPr>
-                <a:solidFill>
-                  <a:schemeClr val="dk1"/>
-                </a:solidFill>
-              </a:defRPr>
+              <a:defRPr/>
             </a:lvl1pPr>
             <a:lvl2pPr indent="-317500" lvl="1" marL="914400">
               <a:spcBef>
@@ -6468,16 +6461,9 @@
               <a:spcAft>
                 <a:spcPts val="0"/>
               </a:spcAft>
-              <a:buClr>
-                <a:schemeClr val="dk1"/>
-              </a:buClr>
               <a:buSzPts val="1400"/>
               <a:buChar char="○"/>
-              <a:defRPr>
-                <a:solidFill>
-                  <a:schemeClr val="dk1"/>
-                </a:solidFill>
-              </a:defRPr>
+              <a:defRPr/>
             </a:lvl2pPr>
             <a:lvl3pPr indent="-317500" lvl="2" marL="1371600">
               <a:spcBef>
@@ -6486,16 +6472,9 @@
               <a:spcAft>
                 <a:spcPts val="0"/>
               </a:spcAft>
-              <a:buClr>
-                <a:schemeClr val="dk1"/>
-              </a:buClr>
               <a:buSzPts val="1400"/>
               <a:buChar char="■"/>
-              <a:defRPr>
-                <a:solidFill>
-                  <a:schemeClr val="dk1"/>
-                </a:solidFill>
-              </a:defRPr>
+              <a:defRPr/>
             </a:lvl3pPr>
             <a:lvl4pPr indent="-317500" lvl="3" marL="1828800">
               <a:spcBef>
@@ -6504,16 +6483,9 @@
               <a:spcAft>
                 <a:spcPts val="0"/>
               </a:spcAft>
-              <a:buClr>
-                <a:schemeClr val="dk1"/>
-              </a:buClr>
               <a:buSzPts val="1400"/>
               <a:buChar char="●"/>
-              <a:defRPr>
-                <a:solidFill>
-                  <a:schemeClr val="dk1"/>
-                </a:solidFill>
-              </a:defRPr>
+              <a:defRPr/>
             </a:lvl4pPr>
             <a:lvl5pPr indent="-317500" lvl="4" marL="2286000">
               <a:spcBef>
@@ -6522,16 +6494,9 @@
               <a:spcAft>
                 <a:spcPts val="0"/>
               </a:spcAft>
-              <a:buClr>
-                <a:schemeClr val="dk1"/>
-              </a:buClr>
               <a:buSzPts val="1400"/>
               <a:buChar char="○"/>
-              <a:defRPr>
-                <a:solidFill>
-                  <a:schemeClr val="dk1"/>
-                </a:solidFill>
-              </a:defRPr>
+              <a:defRPr/>
             </a:lvl5pPr>
             <a:lvl6pPr indent="-317500" lvl="5" marL="2743200">
               <a:spcBef>
@@ -6540,16 +6505,9 @@
               <a:spcAft>
                 <a:spcPts val="0"/>
               </a:spcAft>
-              <a:buClr>
-                <a:schemeClr val="dk1"/>
-              </a:buClr>
               <a:buSzPts val="1400"/>
               <a:buChar char="■"/>
-              <a:defRPr>
-                <a:solidFill>
-                  <a:schemeClr val="dk1"/>
-                </a:solidFill>
-              </a:defRPr>
+              <a:defRPr/>
             </a:lvl6pPr>
             <a:lvl7pPr indent="-317500" lvl="6" marL="3200400">
               <a:spcBef>
@@ -6558,16 +6516,9 @@
               <a:spcAft>
                 <a:spcPts val="0"/>
               </a:spcAft>
-              <a:buClr>
-                <a:schemeClr val="dk1"/>
-              </a:buClr>
               <a:buSzPts val="1400"/>
               <a:buChar char="●"/>
-              <a:defRPr>
-                <a:solidFill>
-                  <a:schemeClr val="dk1"/>
-                </a:solidFill>
-              </a:defRPr>
+              <a:defRPr/>
             </a:lvl7pPr>
             <a:lvl8pPr indent="-317500" lvl="7" marL="3657600">
               <a:spcBef>
@@ -6576,16 +6527,9 @@
               <a:spcAft>
                 <a:spcPts val="0"/>
               </a:spcAft>
-              <a:buClr>
-                <a:schemeClr val="dk1"/>
-              </a:buClr>
               <a:buSzPts val="1400"/>
               <a:buChar char="○"/>
-              <a:defRPr>
-                <a:solidFill>
-                  <a:schemeClr val="dk1"/>
-                </a:solidFill>
-              </a:defRPr>
+              <a:defRPr/>
             </a:lvl8pPr>
             <a:lvl9pPr indent="-317500" lvl="8" marL="4114800">
               <a:spcBef>
@@ -6594,16 +6538,9 @@
               <a:spcAft>
                 <a:spcPts val="0"/>
               </a:spcAft>
-              <a:buClr>
-                <a:schemeClr val="dk1"/>
-              </a:buClr>
               <a:buSzPts val="1400"/>
               <a:buChar char="■"/>
-              <a:defRPr>
-                <a:solidFill>
-                  <a:schemeClr val="dk1"/>
-                </a:solidFill>
-              </a:defRPr>
+              <a:defRPr/>
             </a:lvl9pPr>
           </a:lstStyle>
           <a:p/>
@@ -6838,7 +6775,7 @@
 
 <file path=ppt/slideMasters/slideMaster1.xml><?xml version="1.0" encoding="utf-8"?>
 <p:sldMaster xmlns:a="http://schemas.openxmlformats.org/drawingml/2006/main" xmlns:r="http://schemas.openxmlformats.org/officeDocument/2006/relationships" xmlns:mc="http://schemas.openxmlformats.org/markup-compatibility/2006" xmlns:mv="urn:schemas-microsoft-com:mac:vml" xmlns:p="http://schemas.openxmlformats.org/presentationml/2006/main" xmlns:c="http://schemas.openxmlformats.org/drawingml/2006/chart" xmlns:dgm="http://schemas.openxmlformats.org/drawingml/2006/diagram" xmlns:o="urn:schemas-microsoft-com:office:office" xmlns:v="urn:schemas-microsoft-com:vml" xmlns:pvml="urn:schemas-microsoft-com:office:powerpoint" xmlns:com="http://schemas.openxmlformats.org/drawingml/2006/compatibility" xmlns:p14="http://schemas.microsoft.com/office/powerpoint/2010/main" xmlns:p15="http://schemas.microsoft.com/office/powerpoint/2012/main" xmlns:ahyp="http://schemas.microsoft.com/office/drawing/2018/hyperlinkcolor">
-  <p:cSld name="simple-dark-2">
+  <p:cSld name="simple-light-2">
     <p:bg>
       <p:bgPr>
         <a:solidFill>
@@ -7089,13 +7026,13 @@
                 <a:spcPts val="0"/>
               </a:spcAft>
               <a:buClr>
-                <a:schemeClr val="lt2"/>
+                <a:schemeClr val="dk2"/>
               </a:buClr>
               <a:buSzPts val="1800"/>
               <a:buChar char="●"/>
               <a:defRPr sz="1800">
                 <a:solidFill>
-                  <a:schemeClr val="lt2"/>
+                  <a:schemeClr val="dk2"/>
                 </a:solidFill>
               </a:defRPr>
             </a:lvl1pPr>
@@ -7110,13 +7047,13 @@
                 <a:spcPts val="0"/>
               </a:spcAft>
               <a:buClr>
-                <a:schemeClr val="lt2"/>
+                <a:schemeClr val="dk2"/>
               </a:buClr>
               <a:buSzPts val="1400"/>
               <a:buChar char="○"/>
               <a:defRPr>
                 <a:solidFill>
-                  <a:schemeClr val="lt2"/>
+                  <a:schemeClr val="dk2"/>
                 </a:solidFill>
               </a:defRPr>
             </a:lvl2pPr>
@@ -7131,13 +7068,13 @@
                 <a:spcPts val="0"/>
               </a:spcAft>
               <a:buClr>
-                <a:schemeClr val="lt2"/>
+                <a:schemeClr val="dk2"/>
               </a:buClr>
               <a:buSzPts val="1400"/>
               <a:buChar char="■"/>
               <a:defRPr>
                 <a:solidFill>
-                  <a:schemeClr val="lt2"/>
+                  <a:schemeClr val="dk2"/>
                 </a:solidFill>
               </a:defRPr>
             </a:lvl3pPr>
@@ -7152,13 +7089,13 @@
                 <a:spcPts val="0"/>
               </a:spcAft>
               <a:buClr>
-                <a:schemeClr val="lt2"/>
+                <a:schemeClr val="dk2"/>
               </a:buClr>
               <a:buSzPts val="1400"/>
               <a:buChar char="●"/>
               <a:defRPr>
                 <a:solidFill>
-                  <a:schemeClr val="lt2"/>
+                  <a:schemeClr val="dk2"/>
                 </a:solidFill>
               </a:defRPr>
             </a:lvl4pPr>
@@ -7173,13 +7110,13 @@
                 <a:spcPts val="0"/>
               </a:spcAft>
               <a:buClr>
-                <a:schemeClr val="lt2"/>
+                <a:schemeClr val="dk2"/>
               </a:buClr>
               <a:buSzPts val="1400"/>
               <a:buChar char="○"/>
               <a:defRPr>
                 <a:solidFill>
-                  <a:schemeClr val="lt2"/>
+                  <a:schemeClr val="dk2"/>
                 </a:solidFill>
               </a:defRPr>
             </a:lvl5pPr>
@@ -7194,13 +7131,13 @@
                 <a:spcPts val="0"/>
               </a:spcAft>
               <a:buClr>
-                <a:schemeClr val="lt2"/>
+                <a:schemeClr val="dk2"/>
               </a:buClr>
               <a:buSzPts val="1400"/>
               <a:buChar char="■"/>
               <a:defRPr>
                 <a:solidFill>
-                  <a:schemeClr val="lt2"/>
+                  <a:schemeClr val="dk2"/>
                 </a:solidFill>
               </a:defRPr>
             </a:lvl6pPr>
@@ -7215,13 +7152,13 @@
                 <a:spcPts val="0"/>
               </a:spcAft>
               <a:buClr>
-                <a:schemeClr val="lt2"/>
+                <a:schemeClr val="dk2"/>
               </a:buClr>
               <a:buSzPts val="1400"/>
               <a:buChar char="●"/>
               <a:defRPr>
                 <a:solidFill>
-                  <a:schemeClr val="lt2"/>
+                  <a:schemeClr val="dk2"/>
                 </a:solidFill>
               </a:defRPr>
             </a:lvl7pPr>
@@ -7236,13 +7173,13 @@
                 <a:spcPts val="0"/>
               </a:spcAft>
               <a:buClr>
-                <a:schemeClr val="lt2"/>
+                <a:schemeClr val="dk2"/>
               </a:buClr>
               <a:buSzPts val="1400"/>
               <a:buChar char="○"/>
               <a:defRPr>
                 <a:solidFill>
-                  <a:schemeClr val="lt2"/>
+                  <a:schemeClr val="dk2"/>
                 </a:solidFill>
               </a:defRPr>
             </a:lvl8pPr>
@@ -7257,13 +7194,13 @@
                 <a:spcPts val="0"/>
               </a:spcAft>
               <a:buClr>
-                <a:schemeClr val="lt2"/>
+                <a:schemeClr val="dk2"/>
               </a:buClr>
               <a:buSzPts val="1400"/>
               <a:buChar char="■"/>
               <a:defRPr>
                 <a:solidFill>
-                  <a:schemeClr val="lt2"/>
+                  <a:schemeClr val="dk2"/>
                 </a:solidFill>
               </a:defRPr>
             </a:lvl9pPr>
@@ -7301,7 +7238,7 @@
               <a:buNone/>
               <a:defRPr sz="1000">
                 <a:solidFill>
-                  <a:schemeClr val="lt2"/>
+                  <a:schemeClr val="dk2"/>
                 </a:solidFill>
               </a:defRPr>
             </a:lvl1pPr>
@@ -7309,7 +7246,7 @@
               <a:buNone/>
               <a:defRPr sz="1000">
                 <a:solidFill>
-                  <a:schemeClr val="lt2"/>
+                  <a:schemeClr val="dk2"/>
                 </a:solidFill>
               </a:defRPr>
             </a:lvl2pPr>
@@ -7317,7 +7254,7 @@
               <a:buNone/>
               <a:defRPr sz="1000">
                 <a:solidFill>
-                  <a:schemeClr val="lt2"/>
+                  <a:schemeClr val="dk2"/>
                 </a:solidFill>
               </a:defRPr>
             </a:lvl3pPr>
@@ -7325,7 +7262,7 @@
               <a:buNone/>
               <a:defRPr sz="1000">
                 <a:solidFill>
-                  <a:schemeClr val="lt2"/>
+                  <a:schemeClr val="dk2"/>
                 </a:solidFill>
               </a:defRPr>
             </a:lvl4pPr>
@@ -7333,7 +7270,7 @@
               <a:buNone/>
               <a:defRPr sz="1000">
                 <a:solidFill>
-                  <a:schemeClr val="lt2"/>
+                  <a:schemeClr val="dk2"/>
                 </a:solidFill>
               </a:defRPr>
             </a:lvl5pPr>
@@ -7341,7 +7278,7 @@
               <a:buNone/>
               <a:defRPr sz="1000">
                 <a:solidFill>
-                  <a:schemeClr val="lt2"/>
+                  <a:schemeClr val="dk2"/>
                 </a:solidFill>
               </a:defRPr>
             </a:lvl6pPr>
@@ -7349,7 +7286,7 @@
               <a:buNone/>
               <a:defRPr sz="1000">
                 <a:solidFill>
-                  <a:schemeClr val="lt2"/>
+                  <a:schemeClr val="dk2"/>
                 </a:solidFill>
               </a:defRPr>
             </a:lvl7pPr>
@@ -7357,7 +7294,7 @@
               <a:buNone/>
               <a:defRPr sz="1000">
                 <a:solidFill>
-                  <a:schemeClr val="lt2"/>
+                  <a:schemeClr val="dk2"/>
                 </a:solidFill>
               </a:defRPr>
             </a:lvl8pPr>
@@ -7365,7 +7302,7 @@
               <a:buNone/>
               <a:defRPr sz="1000">
                 <a:solidFill>
-                  <a:schemeClr val="lt2"/>
+                  <a:schemeClr val="dk2"/>
                 </a:solidFill>
               </a:defRPr>
             </a:lvl9pPr>
@@ -8100,6 +8037,13 @@
 <file path=ppt/slides/slide1.xml><?xml version="1.0" encoding="utf-8"?>
 <p:sld xmlns:a="http://schemas.openxmlformats.org/drawingml/2006/main" xmlns:r="http://schemas.openxmlformats.org/officeDocument/2006/relationships" xmlns:mc="http://schemas.openxmlformats.org/markup-compatibility/2006" xmlns:mv="urn:schemas-microsoft-com:mac:vml" xmlns:p="http://schemas.openxmlformats.org/presentationml/2006/main" xmlns:c="http://schemas.openxmlformats.org/drawingml/2006/chart" xmlns:dgm="http://schemas.openxmlformats.org/drawingml/2006/diagram" xmlns:o="urn:schemas-microsoft-com:office:office" xmlns:v="urn:schemas-microsoft-com:vml" xmlns:pvml="urn:schemas-microsoft-com:office:powerpoint" xmlns:com="http://schemas.openxmlformats.org/drawingml/2006/compatibility" xmlns:p14="http://schemas.microsoft.com/office/powerpoint/2010/main" xmlns:p15="http://schemas.microsoft.com/office/powerpoint/2012/main" xmlns:ahyp="http://schemas.microsoft.com/office/drawing/2018/hyperlinkcolor">
   <p:cSld>
+    <p:bg>
+      <p:bgPr>
+        <a:solidFill>
+          <a:schemeClr val="lt1"/>
+        </a:solidFill>
+      </p:bgPr>
+    </p:bg>
     <p:spTree>
       <p:nvGrpSpPr>
         <p:cNvPr id="53" name="Shape 53"/>
@@ -10226,12 +10170,16 @@
             <a:r>
               <a:rPr lang="en" sz="3200">
                 <a:solidFill>
-                  <a:schemeClr val="lt2"/>
+                  <a:schemeClr val="dk2"/>
                 </a:solidFill>
               </a:rPr>
               <a:t>Recap</a:t>
             </a:r>
-            <a:endParaRPr sz="5000"/>
+            <a:endParaRPr sz="5000">
+              <a:solidFill>
+                <a:schemeClr val="dk2"/>
+              </a:solidFill>
+            </a:endParaRPr>
           </a:p>
         </p:txBody>
       </p:sp>
@@ -13575,285 +13523,6 @@
 </file>
 
 <file path=ppt/theme/theme1.xml><?xml version="1.0" encoding="utf-8"?>
-<a:theme xmlns:a="http://schemas.openxmlformats.org/drawingml/2006/main" xmlns:r="http://schemas.openxmlformats.org/officeDocument/2006/relationships" name="Simple Dark">
-  <a:themeElements>
-    <a:clrScheme name="Simple Dark">
-      <a:dk1>
-        <a:srgbClr val="FFFFFF"/>
-      </a:dk1>
-      <a:lt1>
-        <a:srgbClr val="212121"/>
-      </a:lt1>
-      <a:dk2>
-        <a:srgbClr val="303030"/>
-      </a:dk2>
-      <a:lt2>
-        <a:srgbClr val="ADADAD"/>
-      </a:lt2>
-      <a:accent1>
-        <a:srgbClr val="009688"/>
-      </a:accent1>
-      <a:accent2>
-        <a:srgbClr val="EEEEEE"/>
-      </a:accent2>
-      <a:accent3>
-        <a:srgbClr val="78909C"/>
-      </a:accent3>
-      <a:accent4>
-        <a:srgbClr val="FFAB40"/>
-      </a:accent4>
-      <a:accent5>
-        <a:srgbClr val="4DD0E1"/>
-      </a:accent5>
-      <a:accent6>
-        <a:srgbClr val="EEFF41"/>
-      </a:accent6>
-      <a:hlink>
-        <a:srgbClr val="4DD0E1"/>
-      </a:hlink>
-      <a:folHlink>
-        <a:srgbClr val="4DD0E1"/>
-      </a:folHlink>
-    </a:clrScheme>
-    <a:fontScheme name="Office">
-      <a:majorFont>
-        <a:latin typeface="Arial"/>
-        <a:ea typeface=""/>
-        <a:cs typeface=""/>
-        <a:font script="Jpan" typeface="ＭＳ Ｐゴシック"/>
-        <a:font script="Hang" typeface="맑은 고딕"/>
-        <a:font script="Hans" typeface="宋体"/>
-        <a:font script="Hant" typeface="新細明體"/>
-        <a:font script="Arab" typeface="Times New Roman"/>
-        <a:font script="Hebr" typeface="Times New Roman"/>
-        <a:font script="Thai" typeface="Angsana New"/>
-        <a:font script="Ethi" typeface="Nyala"/>
-        <a:font script="Beng" typeface="Vrinda"/>
-        <a:font script="Gujr" typeface="Shruti"/>
-        <a:font script="Khmr" typeface="MoolBoran"/>
-        <a:font script="Knda" typeface="Tunga"/>
-        <a:font script="Guru" typeface="Raavi"/>
-        <a:font script="Cans" typeface="Euphemia"/>
-        <a:font script="Cher" typeface="Plantagenet Cherokee"/>
-        <a:font script="Yiii" typeface="Microsoft Yi Baiti"/>
-        <a:font script="Tibt" typeface="Microsoft Himalaya"/>
-        <a:font script="Thaa" typeface="MV Boli"/>
-        <a:font script="Deva" typeface="Mangal"/>
-        <a:font script="Telu" typeface="Gautami"/>
-        <a:font script="Taml" typeface="Latha"/>
-        <a:font script="Syrc" typeface="Estrangelo Edessa"/>
-        <a:font script="Orya" typeface="Kalinga"/>
-        <a:font script="Mlym" typeface="Kartika"/>
-        <a:font script="Laoo" typeface="DokChampa"/>
-        <a:font script="Sinh" typeface="Iskoola Pota"/>
-        <a:font script="Mong" typeface="Mongolian Baiti"/>
-        <a:font script="Viet" typeface="Times New Roman"/>
-        <a:font script="Uigh" typeface="Microsoft Uighur"/>
-        <a:font script="Geor" typeface="Sylfaen"/>
-      </a:majorFont>
-      <a:minorFont>
-        <a:latin typeface="Arial"/>
-        <a:ea typeface=""/>
-        <a:cs typeface=""/>
-        <a:font script="Jpan" typeface="ＭＳ Ｐゴシック"/>
-        <a:font script="Hang" typeface="맑은 고딕"/>
-        <a:font script="Hans" typeface="宋体"/>
-        <a:font script="Hant" typeface="新細明體"/>
-        <a:font script="Arab" typeface="Arial"/>
-        <a:font script="Hebr" typeface="Arial"/>
-        <a:font script="Thai" typeface="Cordia New"/>
-        <a:font script="Ethi" typeface="Nyala"/>
-        <a:font script="Beng" typeface="Vrinda"/>
-        <a:font script="Gujr" typeface="Shruti"/>
-        <a:font script="Khmr" typeface="DaunPenh"/>
-        <a:font script="Knda" typeface="Tunga"/>
-        <a:font script="Guru" typeface="Raavi"/>
-        <a:font script="Cans" typeface="Euphemia"/>
-        <a:font script="Cher" typeface="Plantagenet Cherokee"/>
-        <a:font script="Yiii" typeface="Microsoft Yi Baiti"/>
-        <a:font script="Tibt" typeface="Microsoft Himalaya"/>
-        <a:font script="Thaa" typeface="MV Boli"/>
-        <a:font script="Deva" typeface="Mangal"/>
-        <a:font script="Telu" typeface="Gautami"/>
-        <a:font script="Taml" typeface="Latha"/>
-        <a:font script="Syrc" typeface="Estrangelo Edessa"/>
-        <a:font script="Orya" typeface="Kalinga"/>
-        <a:font script="Mlym" typeface="Kartika"/>
-        <a:font script="Laoo" typeface="DokChampa"/>
-        <a:font script="Sinh" typeface="Iskoola Pota"/>
-        <a:font script="Mong" typeface="Mongolian Baiti"/>
-        <a:font script="Viet" typeface="Arial"/>
-        <a:font script="Uigh" typeface="Microsoft Uighur"/>
-        <a:font script="Geor" typeface="Sylfaen"/>
-      </a:minorFont>
-    </a:fontScheme>
-    <a:fmtScheme name="Office">
-      <a:fillStyleLst>
-        <a:solidFill>
-          <a:schemeClr val="phClr"/>
-        </a:solidFill>
-        <a:gradFill rotWithShape="1">
-          <a:gsLst>
-            <a:gs pos="0">
-              <a:schemeClr val="phClr">
-                <a:tint val="50000"/>
-                <a:satMod val="300000"/>
-              </a:schemeClr>
-            </a:gs>
-            <a:gs pos="35000">
-              <a:schemeClr val="phClr">
-                <a:tint val="37000"/>
-                <a:satMod val="300000"/>
-              </a:schemeClr>
-            </a:gs>
-            <a:gs pos="100000">
-              <a:schemeClr val="phClr">
-                <a:tint val="15000"/>
-                <a:satMod val="350000"/>
-              </a:schemeClr>
-            </a:gs>
-          </a:gsLst>
-          <a:lin ang="16200000" scaled="1"/>
-        </a:gradFill>
-        <a:gradFill rotWithShape="1">
-          <a:gsLst>
-            <a:gs pos="0">
-              <a:schemeClr val="phClr">
-                <a:tint val="100000"/>
-                <a:shade val="100000"/>
-                <a:satMod val="130000"/>
-              </a:schemeClr>
-            </a:gs>
-            <a:gs pos="100000">
-              <a:schemeClr val="phClr">
-                <a:tint val="50000"/>
-                <a:shade val="100000"/>
-                <a:satMod val="350000"/>
-              </a:schemeClr>
-            </a:gs>
-          </a:gsLst>
-          <a:lin ang="16200000" scaled="0"/>
-        </a:gradFill>
-      </a:fillStyleLst>
-      <a:lnStyleLst>
-        <a:ln w="9525" cap="flat" cmpd="sng" algn="ctr">
-          <a:solidFill>
-            <a:schemeClr val="phClr">
-              <a:shade val="95000"/>
-              <a:satMod val="105000"/>
-            </a:schemeClr>
-          </a:solidFill>
-          <a:prstDash val="solid"/>
-        </a:ln>
-        <a:ln w="25400" cap="flat" cmpd="sng" algn="ctr">
-          <a:solidFill>
-            <a:schemeClr val="phClr"/>
-          </a:solidFill>
-          <a:prstDash val="solid"/>
-        </a:ln>
-        <a:ln w="38100" cap="flat" cmpd="sng" algn="ctr">
-          <a:solidFill>
-            <a:schemeClr val="phClr"/>
-          </a:solidFill>
-          <a:prstDash val="solid"/>
-        </a:ln>
-      </a:lnStyleLst>
-      <a:effectStyleLst>
-        <a:effectStyle>
-          <a:effectLst>
-            <a:outerShdw blurRad="40000" dist="20000" dir="5400000" rotWithShape="0">
-              <a:srgbClr val="000000">
-                <a:alpha val="38000"/>
-              </a:srgbClr>
-            </a:outerShdw>
-          </a:effectLst>
-        </a:effectStyle>
-        <a:effectStyle>
-          <a:effectLst>
-            <a:outerShdw blurRad="40000" dist="23000" dir="5400000" rotWithShape="0">
-              <a:srgbClr val="000000">
-                <a:alpha val="35000"/>
-              </a:srgbClr>
-            </a:outerShdw>
-          </a:effectLst>
-        </a:effectStyle>
-        <a:effectStyle>
-          <a:effectLst>
-            <a:outerShdw blurRad="40000" dist="23000" dir="5400000" rotWithShape="0">
-              <a:srgbClr val="000000">
-                <a:alpha val="35000"/>
-              </a:srgbClr>
-            </a:outerShdw>
-          </a:effectLst>
-          <a:scene3d>
-            <a:camera prst="orthographicFront">
-              <a:rot lat="0" lon="0" rev="0"/>
-            </a:camera>
-            <a:lightRig rig="threePt" dir="t">
-              <a:rot lat="0" lon="0" rev="1200000"/>
-            </a:lightRig>
-          </a:scene3d>
-          <a:sp3d>
-            <a:bevelT w="63500" h="25400"/>
-          </a:sp3d>
-        </a:effectStyle>
-      </a:effectStyleLst>
-      <a:bgFillStyleLst>
-        <a:solidFill>
-          <a:schemeClr val="phClr"/>
-        </a:solidFill>
-        <a:gradFill rotWithShape="1">
-          <a:gsLst>
-            <a:gs pos="0">
-              <a:schemeClr val="phClr">
-                <a:tint val="40000"/>
-                <a:satMod val="350000"/>
-              </a:schemeClr>
-            </a:gs>
-            <a:gs pos="40000">
-              <a:schemeClr val="phClr">
-                <a:tint val="45000"/>
-                <a:shade val="99000"/>
-                <a:satMod val="350000"/>
-              </a:schemeClr>
-            </a:gs>
-            <a:gs pos="100000">
-              <a:schemeClr val="phClr">
-                <a:shade val="20000"/>
-                <a:satMod val="255000"/>
-              </a:schemeClr>
-            </a:gs>
-          </a:gsLst>
-          <a:path path="circle">
-            <a:fillToRect l="50000" t="-80000" r="50000" b="180000"/>
-          </a:path>
-        </a:gradFill>
-        <a:gradFill rotWithShape="1">
-          <a:gsLst>
-            <a:gs pos="0">
-              <a:schemeClr val="phClr">
-                <a:tint val="80000"/>
-                <a:satMod val="300000"/>
-              </a:schemeClr>
-            </a:gs>
-            <a:gs pos="100000">
-              <a:schemeClr val="phClr">
-                <a:shade val="30000"/>
-                <a:satMod val="200000"/>
-              </a:schemeClr>
-            </a:gs>
-          </a:gsLst>
-          <a:path path="circle">
-            <a:fillToRect l="50000" t="50000" r="50000" b="50000"/>
-          </a:path>
-        </a:gradFill>
-      </a:bgFillStyleLst>
-    </a:fmtScheme>
-  </a:themeElements>
-</a:theme>
-</file>
-
-<file path=ppt/theme/theme2.xml><?xml version="1.0" encoding="utf-8"?>
 <a:theme xmlns:a="http://schemas.openxmlformats.org/drawingml/2006/main" xmlns:r="http://schemas.openxmlformats.org/officeDocument/2006/relationships">
   <a:themeElements>
     <a:clrScheme name="Default">
@@ -14130,4 +13799,283 @@
     </a:fmtScheme>
   </a:themeElements>
 </a:theme>
+</file>
+
+<file path=ppt/theme/theme2.xml><?xml version="1.0" encoding="utf-8"?>
+<a:theme xmlns:a="http://schemas.openxmlformats.org/drawingml/2006/main" xmlns:r="http://schemas.openxmlformats.org/officeDocument/2006/relationships" name="Simple Light">
+  <a:themeElements>
+    <a:clrScheme name="Simple Light">
+      <a:dk1>
+        <a:srgbClr val="000000"/>
+      </a:dk1>
+      <a:lt1>
+        <a:srgbClr val="FFFFFF"/>
+      </a:lt1>
+      <a:dk2>
+        <a:srgbClr val="595959"/>
+      </a:dk2>
+      <a:lt2>
+        <a:srgbClr val="EEEEEE"/>
+      </a:lt2>
+      <a:accent1>
+        <a:srgbClr val="4285F4"/>
+      </a:accent1>
+      <a:accent2>
+        <a:srgbClr val="212121"/>
+      </a:accent2>
+      <a:accent3>
+        <a:srgbClr val="78909C"/>
+      </a:accent3>
+      <a:accent4>
+        <a:srgbClr val="FFAB40"/>
+      </a:accent4>
+      <a:accent5>
+        <a:srgbClr val="0097A7"/>
+      </a:accent5>
+      <a:accent6>
+        <a:srgbClr val="EEFF41"/>
+      </a:accent6>
+      <a:hlink>
+        <a:srgbClr val="0097A7"/>
+      </a:hlink>
+      <a:folHlink>
+        <a:srgbClr val="0097A7"/>
+      </a:folHlink>
+    </a:clrScheme>
+    <a:fontScheme name="Office">
+      <a:majorFont>
+        <a:latin typeface="Arial"/>
+        <a:ea typeface=""/>
+        <a:cs typeface=""/>
+        <a:font script="Jpan" typeface="ＭＳ Ｐゴシック"/>
+        <a:font script="Hang" typeface="맑은 고딕"/>
+        <a:font script="Hans" typeface="宋体"/>
+        <a:font script="Hant" typeface="新細明體"/>
+        <a:font script="Arab" typeface="Times New Roman"/>
+        <a:font script="Hebr" typeface="Times New Roman"/>
+        <a:font script="Thai" typeface="Angsana New"/>
+        <a:font script="Ethi" typeface="Nyala"/>
+        <a:font script="Beng" typeface="Vrinda"/>
+        <a:font script="Gujr" typeface="Shruti"/>
+        <a:font script="Khmr" typeface="MoolBoran"/>
+        <a:font script="Knda" typeface="Tunga"/>
+        <a:font script="Guru" typeface="Raavi"/>
+        <a:font script="Cans" typeface="Euphemia"/>
+        <a:font script="Cher" typeface="Plantagenet Cherokee"/>
+        <a:font script="Yiii" typeface="Microsoft Yi Baiti"/>
+        <a:font script="Tibt" typeface="Microsoft Himalaya"/>
+        <a:font script="Thaa" typeface="MV Boli"/>
+        <a:font script="Deva" typeface="Mangal"/>
+        <a:font script="Telu" typeface="Gautami"/>
+        <a:font script="Taml" typeface="Latha"/>
+        <a:font script="Syrc" typeface="Estrangelo Edessa"/>
+        <a:font script="Orya" typeface="Kalinga"/>
+        <a:font script="Mlym" typeface="Kartika"/>
+        <a:font script="Laoo" typeface="DokChampa"/>
+        <a:font script="Sinh" typeface="Iskoola Pota"/>
+        <a:font script="Mong" typeface="Mongolian Baiti"/>
+        <a:font script="Viet" typeface="Times New Roman"/>
+        <a:font script="Uigh" typeface="Microsoft Uighur"/>
+        <a:font script="Geor" typeface="Sylfaen"/>
+      </a:majorFont>
+      <a:minorFont>
+        <a:latin typeface="Arial"/>
+        <a:ea typeface=""/>
+        <a:cs typeface=""/>
+        <a:font script="Jpan" typeface="ＭＳ Ｐゴシック"/>
+        <a:font script="Hang" typeface="맑은 고딕"/>
+        <a:font script="Hans" typeface="宋体"/>
+        <a:font script="Hant" typeface="新細明體"/>
+        <a:font script="Arab" typeface="Arial"/>
+        <a:font script="Hebr" typeface="Arial"/>
+        <a:font script="Thai" typeface="Cordia New"/>
+        <a:font script="Ethi" typeface="Nyala"/>
+        <a:font script="Beng" typeface="Vrinda"/>
+        <a:font script="Gujr" typeface="Shruti"/>
+        <a:font script="Khmr" typeface="DaunPenh"/>
+        <a:font script="Knda" typeface="Tunga"/>
+        <a:font script="Guru" typeface="Raavi"/>
+        <a:font script="Cans" typeface="Euphemia"/>
+        <a:font script="Cher" typeface="Plantagenet Cherokee"/>
+        <a:font script="Yiii" typeface="Microsoft Yi Baiti"/>
+        <a:font script="Tibt" typeface="Microsoft Himalaya"/>
+        <a:font script="Thaa" typeface="MV Boli"/>
+        <a:font script="Deva" typeface="Mangal"/>
+        <a:font script="Telu" typeface="Gautami"/>
+        <a:font script="Taml" typeface="Latha"/>
+        <a:font script="Syrc" typeface="Estrangelo Edessa"/>
+        <a:font script="Orya" typeface="Kalinga"/>
+        <a:font script="Mlym" typeface="Kartika"/>
+        <a:font script="Laoo" typeface="DokChampa"/>
+        <a:font script="Sinh" typeface="Iskoola Pota"/>
+        <a:font script="Mong" typeface="Mongolian Baiti"/>
+        <a:font script="Viet" typeface="Arial"/>
+        <a:font script="Uigh" typeface="Microsoft Uighur"/>
+        <a:font script="Geor" typeface="Sylfaen"/>
+      </a:minorFont>
+    </a:fontScheme>
+    <a:fmtScheme name="Office">
+      <a:fillStyleLst>
+        <a:solidFill>
+          <a:schemeClr val="phClr"/>
+        </a:solidFill>
+        <a:gradFill rotWithShape="1">
+          <a:gsLst>
+            <a:gs pos="0">
+              <a:schemeClr val="phClr">
+                <a:tint val="50000"/>
+                <a:satMod val="300000"/>
+              </a:schemeClr>
+            </a:gs>
+            <a:gs pos="35000">
+              <a:schemeClr val="phClr">
+                <a:tint val="37000"/>
+                <a:satMod val="300000"/>
+              </a:schemeClr>
+            </a:gs>
+            <a:gs pos="100000">
+              <a:schemeClr val="phClr">
+                <a:tint val="15000"/>
+                <a:satMod val="350000"/>
+              </a:schemeClr>
+            </a:gs>
+          </a:gsLst>
+          <a:lin ang="16200000" scaled="1"/>
+        </a:gradFill>
+        <a:gradFill rotWithShape="1">
+          <a:gsLst>
+            <a:gs pos="0">
+              <a:schemeClr val="phClr">
+                <a:tint val="100000"/>
+                <a:shade val="100000"/>
+                <a:satMod val="130000"/>
+              </a:schemeClr>
+            </a:gs>
+            <a:gs pos="100000">
+              <a:schemeClr val="phClr">
+                <a:tint val="50000"/>
+                <a:shade val="100000"/>
+                <a:satMod val="350000"/>
+              </a:schemeClr>
+            </a:gs>
+          </a:gsLst>
+          <a:lin ang="16200000" scaled="0"/>
+        </a:gradFill>
+      </a:fillStyleLst>
+      <a:lnStyleLst>
+        <a:ln w="9525" cap="flat" cmpd="sng" algn="ctr">
+          <a:solidFill>
+            <a:schemeClr val="phClr">
+              <a:shade val="95000"/>
+              <a:satMod val="105000"/>
+            </a:schemeClr>
+          </a:solidFill>
+          <a:prstDash val="solid"/>
+        </a:ln>
+        <a:ln w="25400" cap="flat" cmpd="sng" algn="ctr">
+          <a:solidFill>
+            <a:schemeClr val="phClr"/>
+          </a:solidFill>
+          <a:prstDash val="solid"/>
+        </a:ln>
+        <a:ln w="38100" cap="flat" cmpd="sng" algn="ctr">
+          <a:solidFill>
+            <a:schemeClr val="phClr"/>
+          </a:solidFill>
+          <a:prstDash val="solid"/>
+        </a:ln>
+      </a:lnStyleLst>
+      <a:effectStyleLst>
+        <a:effectStyle>
+          <a:effectLst>
+            <a:outerShdw blurRad="40000" dist="20000" dir="5400000" rotWithShape="0">
+              <a:srgbClr val="000000">
+                <a:alpha val="38000"/>
+              </a:srgbClr>
+            </a:outerShdw>
+          </a:effectLst>
+        </a:effectStyle>
+        <a:effectStyle>
+          <a:effectLst>
+            <a:outerShdw blurRad="40000" dist="23000" dir="5400000" rotWithShape="0">
+              <a:srgbClr val="000000">
+                <a:alpha val="35000"/>
+              </a:srgbClr>
+            </a:outerShdw>
+          </a:effectLst>
+        </a:effectStyle>
+        <a:effectStyle>
+          <a:effectLst>
+            <a:outerShdw blurRad="40000" dist="23000" dir="5400000" rotWithShape="0">
+              <a:srgbClr val="000000">
+                <a:alpha val="35000"/>
+              </a:srgbClr>
+            </a:outerShdw>
+          </a:effectLst>
+          <a:scene3d>
+            <a:camera prst="orthographicFront">
+              <a:rot lat="0" lon="0" rev="0"/>
+            </a:camera>
+            <a:lightRig rig="threePt" dir="t">
+              <a:rot lat="0" lon="0" rev="1200000"/>
+            </a:lightRig>
+          </a:scene3d>
+          <a:sp3d>
+            <a:bevelT w="63500" h="25400"/>
+          </a:sp3d>
+        </a:effectStyle>
+      </a:effectStyleLst>
+      <a:bgFillStyleLst>
+        <a:solidFill>
+          <a:schemeClr val="phClr"/>
+        </a:solidFill>
+        <a:gradFill rotWithShape="1">
+          <a:gsLst>
+            <a:gs pos="0">
+              <a:schemeClr val="phClr">
+                <a:tint val="40000"/>
+                <a:satMod val="350000"/>
+              </a:schemeClr>
+            </a:gs>
+            <a:gs pos="40000">
+              <a:schemeClr val="phClr">
+                <a:tint val="45000"/>
+                <a:shade val="99000"/>
+                <a:satMod val="350000"/>
+              </a:schemeClr>
+            </a:gs>
+            <a:gs pos="100000">
+              <a:schemeClr val="phClr">
+                <a:shade val="20000"/>
+                <a:satMod val="255000"/>
+              </a:schemeClr>
+            </a:gs>
+          </a:gsLst>
+          <a:path path="circle">
+            <a:fillToRect l="50000" t="-80000" r="50000" b="180000"/>
+          </a:path>
+        </a:gradFill>
+        <a:gradFill rotWithShape="1">
+          <a:gsLst>
+            <a:gs pos="0">
+              <a:schemeClr val="phClr">
+                <a:tint val="80000"/>
+                <a:satMod val="300000"/>
+              </a:schemeClr>
+            </a:gs>
+            <a:gs pos="100000">
+              <a:schemeClr val="phClr">
+                <a:shade val="30000"/>
+                <a:satMod val="200000"/>
+              </a:schemeClr>
+            </a:gs>
+          </a:gsLst>
+          <a:path path="circle">
+            <a:fillToRect l="50000" t="50000" r="50000" b="50000"/>
+          </a:path>
+        </a:gradFill>
+      </a:bgFillStyleLst>
+    </a:fmtScheme>
+  </a:themeElements>
+</a:theme>
 </file>
</xml_diff>